<commit_message>
AG3 and AG4 and AG5
</commit_message>
<xml_diff>
--- a/presentation.pptx
+++ b/presentation.pptx
@@ -19109,7 +19109,7 @@
             <a:avLst/>
           </a:prstGeom>
           <a:solidFill>
-            <a:schemeClr val="accent6"/>
+            <a:schemeClr val="accent1"/>
           </a:solidFill>
         </p:spPr>
         <p:style>
@@ -19441,7 +19441,7 @@
             <a:avLst/>
           </a:prstGeom>
           <a:solidFill>
-            <a:schemeClr val="accent6"/>
+            <a:schemeClr val="accent1"/>
           </a:solidFill>
         </p:spPr>
         <p:style>
@@ -19777,7 +19777,7 @@
             <a:avLst/>
           </a:prstGeom>
           <a:solidFill>
-            <a:schemeClr val="accent6"/>
+            <a:schemeClr val="accent1"/>
           </a:solidFill>
         </p:spPr>
         <p:style>
@@ -20621,342 +20621,6 @@
       </p:sp>
       <p:sp>
         <p:nvSpPr>
-          <p:cNvPr id="11" name="Oval 10">
-            <a:extLst>
-              <a:ext uri="{FF2B5EF4-FFF2-40B4-BE49-F238E27FC236}">
-                <a16:creationId xmlns:a16="http://schemas.microsoft.com/office/drawing/2014/main" id="{2433C4F7-A1B8-792B-4871-3632D807C690}"/>
-              </a:ext>
-            </a:extLst>
-          </p:cNvPr>
-          <p:cNvSpPr>
-            <a:spLocks noChangeAspect="1"/>
-          </p:cNvSpPr>
-          <p:nvPr/>
-        </p:nvSpPr>
-        <p:spPr>
-          <a:xfrm>
-            <a:off x="4977120" y="3815465"/>
-            <a:ext cx="720000" cy="720000"/>
-          </a:xfrm>
-          <a:prstGeom prst="ellipse">
-            <a:avLst/>
-          </a:prstGeom>
-          <a:solidFill>
-            <a:schemeClr val="accent1"/>
-          </a:solidFill>
-        </p:spPr>
-        <p:style>
-          <a:lnRef idx="2">
-            <a:schemeClr val="accent1">
-              <a:shade val="15000"/>
-            </a:schemeClr>
-          </a:lnRef>
-          <a:fillRef idx="1">
-            <a:schemeClr val="accent1"/>
-          </a:fillRef>
-          <a:effectRef idx="0">
-            <a:schemeClr val="accent1"/>
-          </a:effectRef>
-          <a:fontRef idx="minor">
-            <a:schemeClr val="lt1"/>
-          </a:fontRef>
-        </p:style>
-        <p:txBody>
-          <a:bodyPr rtlCol="0" anchor="ctr"/>
-          <a:lstStyle/>
-          <a:p>
-            <a:pPr algn="ctr"/>
-            <a:r>
-              <a:rPr lang="en-US" dirty="0"/>
-              <a:t>a</a:t>
-            </a:r>
-          </a:p>
-        </p:txBody>
-      </p:sp>
-      <p:sp>
-        <p:nvSpPr>
-          <p:cNvPr id="12" name="Oval 11">
-            <a:extLst>
-              <a:ext uri="{FF2B5EF4-FFF2-40B4-BE49-F238E27FC236}">
-                <a16:creationId xmlns:a16="http://schemas.microsoft.com/office/drawing/2014/main" id="{1FFF0CAC-B70D-E0EF-2136-22E3AB2BD422}"/>
-              </a:ext>
-            </a:extLst>
-          </p:cNvPr>
-          <p:cNvSpPr>
-            <a:spLocks noChangeAspect="1"/>
-          </p:cNvSpPr>
-          <p:nvPr/>
-        </p:nvSpPr>
-        <p:spPr>
-          <a:xfrm>
-            <a:off x="6374783" y="2734446"/>
-            <a:ext cx="720000" cy="720000"/>
-          </a:xfrm>
-          <a:prstGeom prst="ellipse">
-            <a:avLst/>
-          </a:prstGeom>
-          <a:solidFill>
-            <a:schemeClr val="accent6"/>
-          </a:solidFill>
-        </p:spPr>
-        <p:style>
-          <a:lnRef idx="2">
-            <a:schemeClr val="accent1">
-              <a:shade val="15000"/>
-            </a:schemeClr>
-          </a:lnRef>
-          <a:fillRef idx="1">
-            <a:schemeClr val="accent1"/>
-          </a:fillRef>
-          <a:effectRef idx="0">
-            <a:schemeClr val="accent1"/>
-          </a:effectRef>
-          <a:fontRef idx="minor">
-            <a:schemeClr val="lt1"/>
-          </a:fontRef>
-        </p:style>
-        <p:txBody>
-          <a:bodyPr rtlCol="0" anchor="ctr"/>
-          <a:lstStyle/>
-          <a:p>
-            <a:pPr algn="ctr"/>
-            <a:r>
-              <a:rPr lang="en-US" dirty="0"/>
-              <a:t>b</a:t>
-            </a:r>
-          </a:p>
-        </p:txBody>
-      </p:sp>
-      <p:sp>
-        <p:nvSpPr>
-          <p:cNvPr id="13" name="Oval 12">
-            <a:extLst>
-              <a:ext uri="{FF2B5EF4-FFF2-40B4-BE49-F238E27FC236}">
-                <a16:creationId xmlns:a16="http://schemas.microsoft.com/office/drawing/2014/main" id="{8C600FF4-C673-7633-C7A0-B38E82EC5248}"/>
-              </a:ext>
-            </a:extLst>
-          </p:cNvPr>
-          <p:cNvSpPr>
-            <a:spLocks noChangeAspect="1"/>
-          </p:cNvSpPr>
-          <p:nvPr/>
-        </p:nvSpPr>
-        <p:spPr>
-          <a:xfrm>
-            <a:off x="6374783" y="4927393"/>
-            <a:ext cx="720000" cy="720000"/>
-          </a:xfrm>
-          <a:prstGeom prst="ellipse">
-            <a:avLst/>
-          </a:prstGeom>
-        </p:spPr>
-        <p:style>
-          <a:lnRef idx="2">
-            <a:schemeClr val="accent1">
-              <a:shade val="15000"/>
-            </a:schemeClr>
-          </a:lnRef>
-          <a:fillRef idx="1">
-            <a:schemeClr val="accent1"/>
-          </a:fillRef>
-          <a:effectRef idx="0">
-            <a:schemeClr val="accent1"/>
-          </a:effectRef>
-          <a:fontRef idx="minor">
-            <a:schemeClr val="lt1"/>
-          </a:fontRef>
-        </p:style>
-        <p:txBody>
-          <a:bodyPr rtlCol="0" anchor="ctr"/>
-          <a:lstStyle/>
-          <a:p>
-            <a:pPr algn="ctr"/>
-            <a:r>
-              <a:rPr lang="en-US" dirty="0"/>
-              <a:t>c</a:t>
-            </a:r>
-          </a:p>
-        </p:txBody>
-      </p:sp>
-      <p:cxnSp>
-        <p:nvCxnSpPr>
-          <p:cNvPr id="14" name="Straight Connector 13">
-            <a:extLst>
-              <a:ext uri="{FF2B5EF4-FFF2-40B4-BE49-F238E27FC236}">
-                <a16:creationId xmlns:a16="http://schemas.microsoft.com/office/drawing/2014/main" id="{7A50C19F-59F8-D8FD-D632-33CA957ABEB1}"/>
-              </a:ext>
-            </a:extLst>
-          </p:cNvPr>
-          <p:cNvCxnSpPr>
-            <a:cxnSpLocks/>
-            <a:stCxn id="11" idx="7"/>
-            <a:endCxn id="12" idx="3"/>
-          </p:cNvCxnSpPr>
-          <p:nvPr/>
-        </p:nvCxnSpPr>
-        <p:spPr>
-          <a:xfrm flipV="1">
-            <a:off x="5591678" y="3349004"/>
-            <a:ext cx="888547" cy="571903"/>
-          </a:xfrm>
-          <a:prstGeom prst="line">
-            <a:avLst/>
-          </a:prstGeom>
-          <a:ln w="25400">
-            <a:solidFill>
-              <a:schemeClr val="accent6"/>
-            </a:solidFill>
-            <a:headEnd type="none"/>
-            <a:tailEnd type="triangle" w="lg" len="lg"/>
-          </a:ln>
-        </p:spPr>
-        <p:style>
-          <a:lnRef idx="1">
-            <a:schemeClr val="accent1"/>
-          </a:lnRef>
-          <a:fillRef idx="0">
-            <a:schemeClr val="accent1"/>
-          </a:fillRef>
-          <a:effectRef idx="0">
-            <a:schemeClr val="accent1"/>
-          </a:effectRef>
-          <a:fontRef idx="minor">
-            <a:schemeClr val="tx1"/>
-          </a:fontRef>
-        </p:style>
-      </p:cxnSp>
-      <p:cxnSp>
-        <p:nvCxnSpPr>
-          <p:cNvPr id="15" name="Straight Connector 14">
-            <a:extLst>
-              <a:ext uri="{FF2B5EF4-FFF2-40B4-BE49-F238E27FC236}">
-                <a16:creationId xmlns:a16="http://schemas.microsoft.com/office/drawing/2014/main" id="{BD546BAF-EFBF-E924-1E34-9F09D45AE0E3}"/>
-              </a:ext>
-            </a:extLst>
-          </p:cNvPr>
-          <p:cNvCxnSpPr>
-            <a:stCxn id="11" idx="5"/>
-            <a:endCxn id="13" idx="1"/>
-          </p:cNvCxnSpPr>
-          <p:nvPr/>
-        </p:nvCxnSpPr>
-        <p:spPr>
-          <a:xfrm>
-            <a:off x="5591678" y="4430023"/>
-            <a:ext cx="888547" cy="602812"/>
-          </a:xfrm>
-          <a:prstGeom prst="line">
-            <a:avLst/>
-          </a:prstGeom>
-          <a:ln w="25400">
-            <a:solidFill>
-              <a:schemeClr val="tx1">
-                <a:lumMod val="50000"/>
-                <a:lumOff val="50000"/>
-              </a:schemeClr>
-            </a:solidFill>
-            <a:prstDash val="sysDot"/>
-            <a:tailEnd type="triangle" w="lg" len="lg"/>
-          </a:ln>
-        </p:spPr>
-        <p:style>
-          <a:lnRef idx="1">
-            <a:schemeClr val="accent1"/>
-          </a:lnRef>
-          <a:fillRef idx="0">
-            <a:schemeClr val="accent1"/>
-          </a:fillRef>
-          <a:effectRef idx="0">
-            <a:schemeClr val="accent1"/>
-          </a:effectRef>
-          <a:fontRef idx="minor">
-            <a:schemeClr val="tx1"/>
-          </a:fontRef>
-        </p:style>
-      </p:cxnSp>
-      <p:cxnSp>
-        <p:nvCxnSpPr>
-          <p:cNvPr id="16" name="Straight Connector 15">
-            <a:extLst>
-              <a:ext uri="{FF2B5EF4-FFF2-40B4-BE49-F238E27FC236}">
-                <a16:creationId xmlns:a16="http://schemas.microsoft.com/office/drawing/2014/main" id="{860F3034-FEDD-C87C-03A3-CF8B4F204D50}"/>
-              </a:ext>
-            </a:extLst>
-          </p:cNvPr>
-          <p:cNvCxnSpPr>
-            <a:stCxn id="12" idx="4"/>
-            <a:endCxn id="13" idx="0"/>
-          </p:cNvCxnSpPr>
-          <p:nvPr/>
-        </p:nvCxnSpPr>
-        <p:spPr>
-          <a:xfrm>
-            <a:off x="6734783" y="3454446"/>
-            <a:ext cx="0" cy="1472947"/>
-          </a:xfrm>
-          <a:prstGeom prst="line">
-            <a:avLst/>
-          </a:prstGeom>
-          <a:ln w="25400">
-            <a:solidFill>
-              <a:schemeClr val="accent6"/>
-            </a:solidFill>
-            <a:prstDash val="solid"/>
-            <a:tailEnd type="triangle" w="lg" len="lg"/>
-          </a:ln>
-        </p:spPr>
-        <p:style>
-          <a:lnRef idx="1">
-            <a:schemeClr val="accent1"/>
-          </a:lnRef>
-          <a:fillRef idx="0">
-            <a:schemeClr val="accent1"/>
-          </a:fillRef>
-          <a:effectRef idx="0">
-            <a:schemeClr val="accent1"/>
-          </a:effectRef>
-          <a:fontRef idx="minor">
-            <a:schemeClr val="tx1"/>
-          </a:fontRef>
-        </p:style>
-      </p:cxnSp>
-      <p:sp>
-        <p:nvSpPr>
-          <p:cNvPr id="17" name="TextBox 16">
-            <a:extLst>
-              <a:ext uri="{FF2B5EF4-FFF2-40B4-BE49-F238E27FC236}">
-                <a16:creationId xmlns:a16="http://schemas.microsoft.com/office/drawing/2014/main" id="{FBDFDABB-B8D0-D53C-EB7D-778AD5406748}"/>
-              </a:ext>
-            </a:extLst>
-          </p:cNvPr>
-          <p:cNvSpPr txBox="1"/>
-          <p:nvPr/>
-        </p:nvSpPr>
-        <p:spPr>
-          <a:xfrm>
-            <a:off x="5591678" y="4817260"/>
-            <a:ext cx="933856" cy="369332"/>
-          </a:xfrm>
-          <a:prstGeom prst="rect">
-            <a:avLst/>
-          </a:prstGeom>
-          <a:noFill/>
-        </p:spPr>
-        <p:txBody>
-          <a:bodyPr wrap="square" rtlCol="0">
-            <a:spAutoFit/>
-          </a:bodyPr>
-          <a:lstStyle/>
-          <a:p>
-            <a:r>
-              <a:rPr lang="en-US" dirty="0"/>
-              <a:t>?</a:t>
-            </a:r>
-          </a:p>
-        </p:txBody>
-      </p:sp>
-      <p:sp>
-        <p:nvSpPr>
           <p:cNvPr id="18" name="Oval 17">
             <a:extLst>
               <a:ext uri="{FF2B5EF4-FFF2-40B4-BE49-F238E27FC236}">
@@ -21560,11 +21224,11 @@
               <a:t>nd</a:t>
             </a:r>
             <a:r>
-              <a:rPr lang="en-US" sz="3600" baseline="30000" dirty="0"/>
-              <a:t>-</a:t>
-            </a:r>
-            <a:r>
-              <a:rPr lang="en-US" sz="2400" dirty="0"/>
+              <a:rPr lang="en-US" sz="3600" baseline="30000" dirty="0" err="1"/>
+              <a:t>+</a:t>
+            </a:r>
+            <a:r>
+              <a:rPr lang="en-US" sz="2400" dirty="0" err="1"/>
               <a:t>d</a:t>
             </a:r>
             <a:r>
@@ -21581,10 +21245,10 @@
       </p:sp>
       <p:sp>
         <p:nvSpPr>
-          <p:cNvPr id="32" name="Multiply 31">
-            <a:extLst>
-              <a:ext uri="{FF2B5EF4-FFF2-40B4-BE49-F238E27FC236}">
-                <a16:creationId xmlns:a16="http://schemas.microsoft.com/office/drawing/2014/main" id="{226E60CE-453C-87F1-6E4F-08369648F234}"/>
+          <p:cNvPr id="33" name="Multiply 32">
+            <a:extLst>
+              <a:ext uri="{FF2B5EF4-FFF2-40B4-BE49-F238E27FC236}">
+                <a16:creationId xmlns:a16="http://schemas.microsoft.com/office/drawing/2014/main" id="{8D528928-25DA-46AA-8751-1E6C3807F233}"/>
               </a:ext>
             </a:extLst>
           </p:cNvPr>
@@ -21593,7 +21257,7 @@
         </p:nvSpPr>
         <p:spPr>
           <a:xfrm>
-            <a:off x="4419553" y="2417690"/>
+            <a:off x="7779046" y="2376638"/>
             <a:ext cx="4057914" cy="3431474"/>
           </a:xfrm>
           <a:prstGeom prst="mathMultiply">
@@ -21626,58 +21290,7 @@
           <a:lstStyle/>
           <a:p>
             <a:pPr algn="ctr"/>
-            <a:endParaRPr lang="en-US"/>
-          </a:p>
-        </p:txBody>
-      </p:sp>
-      <p:sp>
-        <p:nvSpPr>
-          <p:cNvPr id="33" name="Multiply 32">
-            <a:extLst>
-              <a:ext uri="{FF2B5EF4-FFF2-40B4-BE49-F238E27FC236}">
-                <a16:creationId xmlns:a16="http://schemas.microsoft.com/office/drawing/2014/main" id="{8D528928-25DA-46AA-8751-1E6C3807F233}"/>
-              </a:ext>
-            </a:extLst>
-          </p:cNvPr>
-          <p:cNvSpPr/>
-          <p:nvPr/>
-        </p:nvSpPr>
-        <p:spPr>
-          <a:xfrm>
-            <a:off x="7779046" y="2376638"/>
-            <a:ext cx="4057914" cy="3431474"/>
-          </a:xfrm>
-          <a:prstGeom prst="mathMultiply">
-            <a:avLst>
-              <a:gd name="adj1" fmla="val 8779"/>
-            </a:avLst>
-          </a:prstGeom>
-          <a:solidFill>
-            <a:srgbClr val="FF0000"/>
-          </a:solidFill>
-        </p:spPr>
-        <p:style>
-          <a:lnRef idx="2">
-            <a:schemeClr val="accent1">
-              <a:shade val="15000"/>
-            </a:schemeClr>
-          </a:lnRef>
-          <a:fillRef idx="1">
-            <a:schemeClr val="accent1"/>
-          </a:fillRef>
-          <a:effectRef idx="0">
-            <a:schemeClr val="accent1"/>
-          </a:effectRef>
-          <a:fontRef idx="minor">
-            <a:schemeClr val="lt1"/>
-          </a:fontRef>
-        </p:style>
-        <p:txBody>
-          <a:bodyPr rtlCol="0" anchor="ctr"/>
-          <a:lstStyle/>
-          <a:p>
-            <a:pPr algn="ctr"/>
-            <a:endParaRPr lang="en-US"/>
+            <a:endParaRPr lang="en-US" dirty="0"/>
           </a:p>
         </p:txBody>
       </p:sp>
@@ -21733,6 +21346,425 @@
               <a:t>Counting triangles is fast</a:t>
             </a:r>
             <a:endParaRPr lang="en-US" dirty="0"/>
+          </a:p>
+        </p:txBody>
+      </p:sp>
+      <p:sp>
+        <p:nvSpPr>
+          <p:cNvPr id="35" name="Oval 34">
+            <a:extLst>
+              <a:ext uri="{FF2B5EF4-FFF2-40B4-BE49-F238E27FC236}">
+                <a16:creationId xmlns:a16="http://schemas.microsoft.com/office/drawing/2014/main" id="{47313107-B5FA-301F-86B3-01CDAFFF5190}"/>
+              </a:ext>
+            </a:extLst>
+          </p:cNvPr>
+          <p:cNvSpPr>
+            <a:spLocks noChangeAspect="1"/>
+          </p:cNvSpPr>
+          <p:nvPr/>
+        </p:nvSpPr>
+        <p:spPr>
+          <a:xfrm>
+            <a:off x="4977120" y="3815465"/>
+            <a:ext cx="720000" cy="720000"/>
+          </a:xfrm>
+          <a:prstGeom prst="ellipse">
+            <a:avLst/>
+          </a:prstGeom>
+          <a:solidFill>
+            <a:schemeClr val="accent6"/>
+          </a:solidFill>
+        </p:spPr>
+        <p:style>
+          <a:lnRef idx="2">
+            <a:schemeClr val="accent1">
+              <a:shade val="15000"/>
+            </a:schemeClr>
+          </a:lnRef>
+          <a:fillRef idx="1">
+            <a:schemeClr val="accent1"/>
+          </a:fillRef>
+          <a:effectRef idx="0">
+            <a:schemeClr val="accent1"/>
+          </a:effectRef>
+          <a:fontRef idx="minor">
+            <a:schemeClr val="lt1"/>
+          </a:fontRef>
+        </p:style>
+        <p:txBody>
+          <a:bodyPr rtlCol="0" anchor="ctr"/>
+          <a:lstStyle/>
+          <a:p>
+            <a:pPr algn="ctr"/>
+            <a:r>
+              <a:rPr lang="en-US" dirty="0"/>
+              <a:t>a</a:t>
+            </a:r>
+          </a:p>
+        </p:txBody>
+      </p:sp>
+      <p:sp>
+        <p:nvSpPr>
+          <p:cNvPr id="36" name="Oval 35">
+            <a:extLst>
+              <a:ext uri="{FF2B5EF4-FFF2-40B4-BE49-F238E27FC236}">
+                <a16:creationId xmlns:a16="http://schemas.microsoft.com/office/drawing/2014/main" id="{29AA2859-8235-54AB-F04D-BF44574F32FE}"/>
+              </a:ext>
+            </a:extLst>
+          </p:cNvPr>
+          <p:cNvSpPr>
+            <a:spLocks noChangeAspect="1"/>
+          </p:cNvSpPr>
+          <p:nvPr/>
+        </p:nvSpPr>
+        <p:spPr>
+          <a:xfrm>
+            <a:off x="6374783" y="2734446"/>
+            <a:ext cx="720000" cy="720000"/>
+          </a:xfrm>
+          <a:prstGeom prst="ellipse">
+            <a:avLst/>
+          </a:prstGeom>
+          <a:solidFill>
+            <a:schemeClr val="accent1"/>
+          </a:solidFill>
+        </p:spPr>
+        <p:style>
+          <a:lnRef idx="2">
+            <a:schemeClr val="accent1">
+              <a:shade val="15000"/>
+            </a:schemeClr>
+          </a:lnRef>
+          <a:fillRef idx="1">
+            <a:schemeClr val="accent1"/>
+          </a:fillRef>
+          <a:effectRef idx="0">
+            <a:schemeClr val="accent1"/>
+          </a:effectRef>
+          <a:fontRef idx="minor">
+            <a:schemeClr val="lt1"/>
+          </a:fontRef>
+        </p:style>
+        <p:txBody>
+          <a:bodyPr rtlCol="0" anchor="ctr"/>
+          <a:lstStyle/>
+          <a:p>
+            <a:pPr algn="ctr"/>
+            <a:r>
+              <a:rPr lang="en-US" dirty="0"/>
+              <a:t>b</a:t>
+            </a:r>
+          </a:p>
+        </p:txBody>
+      </p:sp>
+      <p:sp>
+        <p:nvSpPr>
+          <p:cNvPr id="37" name="Oval 36">
+            <a:extLst>
+              <a:ext uri="{FF2B5EF4-FFF2-40B4-BE49-F238E27FC236}">
+                <a16:creationId xmlns:a16="http://schemas.microsoft.com/office/drawing/2014/main" id="{25C3591D-3329-B86A-E211-7C3E992FBEFD}"/>
+              </a:ext>
+            </a:extLst>
+          </p:cNvPr>
+          <p:cNvSpPr>
+            <a:spLocks noChangeAspect="1"/>
+          </p:cNvSpPr>
+          <p:nvPr/>
+        </p:nvSpPr>
+        <p:spPr>
+          <a:xfrm>
+            <a:off x="6374783" y="4927393"/>
+            <a:ext cx="720000" cy="720000"/>
+          </a:xfrm>
+          <a:prstGeom prst="ellipse">
+            <a:avLst/>
+          </a:prstGeom>
+        </p:spPr>
+        <p:style>
+          <a:lnRef idx="2">
+            <a:schemeClr val="accent1">
+              <a:shade val="15000"/>
+            </a:schemeClr>
+          </a:lnRef>
+          <a:fillRef idx="1">
+            <a:schemeClr val="accent1"/>
+          </a:fillRef>
+          <a:effectRef idx="0">
+            <a:schemeClr val="accent1"/>
+          </a:effectRef>
+          <a:fontRef idx="minor">
+            <a:schemeClr val="lt1"/>
+          </a:fontRef>
+        </p:style>
+        <p:txBody>
+          <a:bodyPr rtlCol="0" anchor="ctr"/>
+          <a:lstStyle/>
+          <a:p>
+            <a:pPr algn="ctr"/>
+            <a:r>
+              <a:rPr lang="en-US" dirty="0"/>
+              <a:t>c</a:t>
+            </a:r>
+          </a:p>
+        </p:txBody>
+      </p:sp>
+      <p:cxnSp>
+        <p:nvCxnSpPr>
+          <p:cNvPr id="38" name="Straight Connector 37">
+            <a:extLst>
+              <a:ext uri="{FF2B5EF4-FFF2-40B4-BE49-F238E27FC236}">
+                <a16:creationId xmlns:a16="http://schemas.microsoft.com/office/drawing/2014/main" id="{0AC116E8-E5AE-03A8-97B7-73D85F13F013}"/>
+              </a:ext>
+            </a:extLst>
+          </p:cNvPr>
+          <p:cNvCxnSpPr>
+            <a:cxnSpLocks/>
+            <a:stCxn id="35" idx="7"/>
+            <a:endCxn id="36" idx="3"/>
+          </p:cNvCxnSpPr>
+          <p:nvPr/>
+        </p:nvCxnSpPr>
+        <p:spPr>
+          <a:xfrm flipV="1">
+            <a:off x="5591678" y="3349004"/>
+            <a:ext cx="888547" cy="571903"/>
+          </a:xfrm>
+          <a:prstGeom prst="line">
+            <a:avLst/>
+          </a:prstGeom>
+          <a:ln w="25400">
+            <a:solidFill>
+              <a:schemeClr val="accent6"/>
+            </a:solidFill>
+            <a:headEnd type="none"/>
+            <a:tailEnd type="triangle" w="lg" len="lg"/>
+          </a:ln>
+        </p:spPr>
+        <p:style>
+          <a:lnRef idx="1">
+            <a:schemeClr val="accent1"/>
+          </a:lnRef>
+          <a:fillRef idx="0">
+            <a:schemeClr val="accent1"/>
+          </a:fillRef>
+          <a:effectRef idx="0">
+            <a:schemeClr val="accent1"/>
+          </a:effectRef>
+          <a:fontRef idx="minor">
+            <a:schemeClr val="tx1"/>
+          </a:fontRef>
+        </p:style>
+      </p:cxnSp>
+      <p:cxnSp>
+        <p:nvCxnSpPr>
+          <p:cNvPr id="39" name="Straight Connector 38">
+            <a:extLst>
+              <a:ext uri="{FF2B5EF4-FFF2-40B4-BE49-F238E27FC236}">
+                <a16:creationId xmlns:a16="http://schemas.microsoft.com/office/drawing/2014/main" id="{F182A0D4-AE14-B068-77A9-6DD75E3A0F63}"/>
+              </a:ext>
+            </a:extLst>
+          </p:cNvPr>
+          <p:cNvCxnSpPr>
+            <a:stCxn id="35" idx="5"/>
+            <a:endCxn id="37" idx="1"/>
+          </p:cNvCxnSpPr>
+          <p:nvPr/>
+        </p:nvCxnSpPr>
+        <p:spPr>
+          <a:xfrm>
+            <a:off x="5591678" y="4430023"/>
+            <a:ext cx="888547" cy="602812"/>
+          </a:xfrm>
+          <a:prstGeom prst="line">
+            <a:avLst/>
+          </a:prstGeom>
+          <a:ln w="25400">
+            <a:solidFill>
+              <a:schemeClr val="tx1">
+                <a:lumMod val="50000"/>
+                <a:lumOff val="50000"/>
+              </a:schemeClr>
+            </a:solidFill>
+            <a:prstDash val="sysDot"/>
+            <a:tailEnd type="triangle" w="lg" len="lg"/>
+          </a:ln>
+        </p:spPr>
+        <p:style>
+          <a:lnRef idx="1">
+            <a:schemeClr val="accent1"/>
+          </a:lnRef>
+          <a:fillRef idx="0">
+            <a:schemeClr val="accent1"/>
+          </a:fillRef>
+          <a:effectRef idx="0">
+            <a:schemeClr val="accent1"/>
+          </a:effectRef>
+          <a:fontRef idx="minor">
+            <a:schemeClr val="tx1"/>
+          </a:fontRef>
+        </p:style>
+      </p:cxnSp>
+      <p:cxnSp>
+        <p:nvCxnSpPr>
+          <p:cNvPr id="40" name="Straight Connector 39">
+            <a:extLst>
+              <a:ext uri="{FF2B5EF4-FFF2-40B4-BE49-F238E27FC236}">
+                <a16:creationId xmlns:a16="http://schemas.microsoft.com/office/drawing/2014/main" id="{171E9325-66D4-B366-FD00-3E3637FCB306}"/>
+              </a:ext>
+            </a:extLst>
+          </p:cNvPr>
+          <p:cNvCxnSpPr>
+            <a:stCxn id="36" idx="4"/>
+            <a:endCxn id="37" idx="0"/>
+          </p:cNvCxnSpPr>
+          <p:nvPr/>
+        </p:nvCxnSpPr>
+        <p:spPr>
+          <a:xfrm>
+            <a:off x="6734783" y="3454446"/>
+            <a:ext cx="0" cy="1472947"/>
+          </a:xfrm>
+          <a:prstGeom prst="line">
+            <a:avLst/>
+          </a:prstGeom>
+          <a:ln w="25400">
+            <a:solidFill>
+              <a:schemeClr val="accent6"/>
+            </a:solidFill>
+            <a:prstDash val="solid"/>
+            <a:tailEnd type="triangle" w="lg" len="lg"/>
+          </a:ln>
+        </p:spPr>
+        <p:style>
+          <a:lnRef idx="1">
+            <a:schemeClr val="accent1"/>
+          </a:lnRef>
+          <a:fillRef idx="0">
+            <a:schemeClr val="accent1"/>
+          </a:fillRef>
+          <a:effectRef idx="0">
+            <a:schemeClr val="accent1"/>
+          </a:effectRef>
+          <a:fontRef idx="minor">
+            <a:schemeClr val="tx1"/>
+          </a:fontRef>
+        </p:style>
+      </p:cxnSp>
+      <p:sp>
+        <p:nvSpPr>
+          <p:cNvPr id="41" name="TextBox 40">
+            <a:extLst>
+              <a:ext uri="{FF2B5EF4-FFF2-40B4-BE49-F238E27FC236}">
+                <a16:creationId xmlns:a16="http://schemas.microsoft.com/office/drawing/2014/main" id="{E2AF84A5-E146-4E3C-4E50-3F7DDC43E6F0}"/>
+              </a:ext>
+            </a:extLst>
+          </p:cNvPr>
+          <p:cNvSpPr txBox="1"/>
+          <p:nvPr/>
+        </p:nvSpPr>
+        <p:spPr>
+          <a:xfrm>
+            <a:off x="5591678" y="4817260"/>
+            <a:ext cx="933856" cy="369332"/>
+          </a:xfrm>
+          <a:prstGeom prst="rect">
+            <a:avLst/>
+          </a:prstGeom>
+          <a:noFill/>
+        </p:spPr>
+        <p:txBody>
+          <a:bodyPr wrap="square" rtlCol="0">
+            <a:spAutoFit/>
+          </a:bodyPr>
+          <a:lstStyle/>
+          <a:p>
+            <a:r>
+              <a:rPr lang="en-US" dirty="0"/>
+              <a:t>?</a:t>
+            </a:r>
+          </a:p>
+        </p:txBody>
+      </p:sp>
+      <p:sp>
+        <p:nvSpPr>
+          <p:cNvPr id="42" name="Multiply 41">
+            <a:extLst>
+              <a:ext uri="{FF2B5EF4-FFF2-40B4-BE49-F238E27FC236}">
+                <a16:creationId xmlns:a16="http://schemas.microsoft.com/office/drawing/2014/main" id="{34A85C09-09C5-1476-7EB7-4313D434C25E}"/>
+              </a:ext>
+            </a:extLst>
+          </p:cNvPr>
+          <p:cNvSpPr/>
+          <p:nvPr/>
+        </p:nvSpPr>
+        <p:spPr>
+          <a:xfrm>
+            <a:off x="4434251" y="2430433"/>
+            <a:ext cx="4057914" cy="3431474"/>
+          </a:xfrm>
+          <a:prstGeom prst="mathMultiply">
+            <a:avLst>
+              <a:gd name="adj1" fmla="val 8779"/>
+            </a:avLst>
+          </a:prstGeom>
+          <a:solidFill>
+            <a:srgbClr val="FF0000"/>
+          </a:solidFill>
+        </p:spPr>
+        <p:style>
+          <a:lnRef idx="2">
+            <a:schemeClr val="accent1">
+              <a:shade val="15000"/>
+            </a:schemeClr>
+          </a:lnRef>
+          <a:fillRef idx="1">
+            <a:schemeClr val="accent1"/>
+          </a:fillRef>
+          <a:effectRef idx="0">
+            <a:schemeClr val="accent1"/>
+          </a:effectRef>
+          <a:fontRef idx="minor">
+            <a:schemeClr val="lt1"/>
+          </a:fontRef>
+        </p:style>
+        <p:txBody>
+          <a:bodyPr rtlCol="0" anchor="ctr"/>
+          <a:lstStyle/>
+          <a:p>
+            <a:pPr algn="ctr"/>
+            <a:endParaRPr lang="en-US" dirty="0"/>
+          </a:p>
+        </p:txBody>
+      </p:sp>
+      <p:sp>
+        <p:nvSpPr>
+          <p:cNvPr id="43" name="TextBox 42">
+            <a:extLst>
+              <a:ext uri="{FF2B5EF4-FFF2-40B4-BE49-F238E27FC236}">
+                <a16:creationId xmlns:a16="http://schemas.microsoft.com/office/drawing/2014/main" id="{3B0439FB-7181-D2A0-34AF-2FD85D7FD407}"/>
+              </a:ext>
+            </a:extLst>
+          </p:cNvPr>
+          <p:cNvSpPr txBox="1"/>
+          <p:nvPr/>
+        </p:nvSpPr>
+        <p:spPr>
+          <a:xfrm>
+            <a:off x="-1322962" y="4552545"/>
+            <a:ext cx="184731" cy="369332"/>
+          </a:xfrm>
+          <a:prstGeom prst="rect">
+            <a:avLst/>
+          </a:prstGeom>
+          <a:noFill/>
+        </p:spPr>
+        <p:txBody>
+          <a:bodyPr wrap="none" rtlCol="0">
+            <a:spAutoFit/>
+          </a:bodyPr>
+          <a:lstStyle/>
+          <a:p>
+            <a:endParaRPr lang="en-US"/>
           </a:p>
         </p:txBody>
       </p:sp>

</xml_diff>